<commit_message>
Push front end changes
</commit_message>
<xml_diff>
--- a/Helping the Homeless with QCare Qiosk.pptx
+++ b/Helping the Homeless with QCare Qiosk.pptx
@@ -8,7 +8,10 @@
     <p:sldId id="256" r:id="rId2"/>
     <p:sldId id="257" r:id="rId3"/>
     <p:sldId id="259" r:id="rId4"/>
-    <p:sldId id="258" r:id="rId5"/>
+    <p:sldId id="260" r:id="rId5"/>
+    <p:sldId id="261" r:id="rId6"/>
+    <p:sldId id="262" r:id="rId7"/>
+    <p:sldId id="258" r:id="rId8"/>
   </p:sldIdLst>
   <p:sldSz cx="12192000" cy="6858000"/>
   <p:notesSz cx="6858000" cy="9144000"/>
@@ -308,7 +311,7 @@
             <a:fld id="{B61BEF0D-F0BB-DE4B-95CE-6DB70DBA9567}" type="datetimeFigureOut">
               <a:rPr lang="en-US" dirty="0"/>
               <a:pPr/>
-              <a:t>7/8/2017</a:t>
+              <a:t>7/12/2017</a:t>
             </a:fld>
             <a:endParaRPr lang="en-US" dirty="0"/>
           </a:p>
@@ -643,7 +646,7 @@
             <a:fld id="{B61BEF0D-F0BB-DE4B-95CE-6DB70DBA9567}" type="datetimeFigureOut">
               <a:rPr lang="en-US" dirty="0"/>
               <a:pPr/>
-              <a:t>7/8/2017</a:t>
+              <a:t>7/12/2017</a:t>
             </a:fld>
             <a:endParaRPr lang="en-US" dirty="0"/>
           </a:p>
@@ -1041,7 +1044,7 @@
             <a:fld id="{B61BEF0D-F0BB-DE4B-95CE-6DB70DBA9567}" type="datetimeFigureOut">
               <a:rPr lang="en-US" dirty="0"/>
               <a:pPr/>
-              <a:t>7/8/2017</a:t>
+              <a:t>7/12/2017</a:t>
             </a:fld>
             <a:endParaRPr lang="en-US" dirty="0"/>
           </a:p>
@@ -1374,7 +1377,7 @@
             <a:fld id="{B61BEF0D-F0BB-DE4B-95CE-6DB70DBA9567}" type="datetimeFigureOut">
               <a:rPr lang="en-US" dirty="0"/>
               <a:pPr/>
-              <a:t>7/8/2017</a:t>
+              <a:t>7/12/2017</a:t>
             </a:fld>
             <a:endParaRPr lang="en-US" dirty="0"/>
           </a:p>
@@ -1691,7 +1694,7 @@
             <a:fld id="{B61BEF0D-F0BB-DE4B-95CE-6DB70DBA9567}" type="datetimeFigureOut">
               <a:rPr lang="en-US" dirty="0"/>
               <a:pPr/>
-              <a:t>7/8/2017</a:t>
+              <a:t>7/12/2017</a:t>
             </a:fld>
             <a:endParaRPr lang="en-US" dirty="0"/>
           </a:p>
@@ -2084,7 +2087,7 @@
             <a:fld id="{B61BEF0D-F0BB-DE4B-95CE-6DB70DBA9567}" type="datetimeFigureOut">
               <a:rPr lang="en-US" dirty="0"/>
               <a:pPr/>
-              <a:t>7/8/2017</a:t>
+              <a:t>7/12/2017</a:t>
             </a:fld>
             <a:endParaRPr lang="en-US" dirty="0"/>
           </a:p>
@@ -2338,7 +2341,7 @@
             <a:fld id="{B61BEF0D-F0BB-DE4B-95CE-6DB70DBA9567}" type="datetimeFigureOut">
               <a:rPr lang="en-US" dirty="0"/>
               <a:pPr/>
-              <a:t>7/8/2017</a:t>
+              <a:t>7/12/2017</a:t>
             </a:fld>
             <a:endParaRPr lang="en-US" dirty="0"/>
           </a:p>
@@ -2597,7 +2600,7 @@
             <a:fld id="{B61BEF0D-F0BB-DE4B-95CE-6DB70DBA9567}" type="datetimeFigureOut">
               <a:rPr lang="en-US" dirty="0"/>
               <a:pPr/>
-              <a:t>7/8/2017</a:t>
+              <a:t>7/12/2017</a:t>
             </a:fld>
             <a:endParaRPr lang="en-US" dirty="0"/>
           </a:p>
@@ -2856,7 +2859,7 @@
             <a:fld id="{B61BEF0D-F0BB-DE4B-95CE-6DB70DBA9567}" type="datetimeFigureOut">
               <a:rPr lang="en-US" dirty="0"/>
               <a:pPr/>
-              <a:t>7/8/2017</a:t>
+              <a:t>7/12/2017</a:t>
             </a:fld>
             <a:endParaRPr lang="en-US" dirty="0"/>
           </a:p>
@@ -3182,7 +3185,7 @@
             <a:fld id="{B61BEF0D-F0BB-DE4B-95CE-6DB70DBA9567}" type="datetimeFigureOut">
               <a:rPr lang="en-US" dirty="0"/>
               <a:pPr/>
-              <a:t>7/8/2017</a:t>
+              <a:t>7/12/2017</a:t>
             </a:fld>
             <a:endParaRPr lang="en-US" dirty="0"/>
           </a:p>
@@ -3502,7 +3505,7 @@
             <a:fld id="{B61BEF0D-F0BB-DE4B-95CE-6DB70DBA9567}" type="datetimeFigureOut">
               <a:rPr lang="en-US" dirty="0"/>
               <a:pPr/>
-              <a:t>7/8/2017</a:t>
+              <a:t>7/12/2017</a:t>
             </a:fld>
             <a:endParaRPr lang="en-US" dirty="0"/>
           </a:p>
@@ -3956,7 +3959,7 @@
             <a:fld id="{B61BEF0D-F0BB-DE4B-95CE-6DB70DBA9567}" type="datetimeFigureOut">
               <a:rPr lang="en-US" dirty="0"/>
               <a:pPr/>
-              <a:t>7/8/2017</a:t>
+              <a:t>7/12/2017</a:t>
             </a:fld>
             <a:endParaRPr lang="en-US" dirty="0"/>
           </a:p>
@@ -4158,7 +4161,7 @@
             <a:fld id="{B61BEF0D-F0BB-DE4B-95CE-6DB70DBA9567}" type="datetimeFigureOut">
               <a:rPr lang="en-US" dirty="0"/>
               <a:pPr/>
-              <a:t>7/8/2017</a:t>
+              <a:t>7/12/2017</a:t>
             </a:fld>
             <a:endParaRPr lang="en-US" dirty="0"/>
           </a:p>
@@ -4332,7 +4335,7 @@
             <a:fld id="{B61BEF0D-F0BB-DE4B-95CE-6DB70DBA9567}" type="datetimeFigureOut">
               <a:rPr lang="en-US" dirty="0"/>
               <a:pPr/>
-              <a:t>7/8/2017</a:t>
+              <a:t>7/12/2017</a:t>
             </a:fld>
             <a:endParaRPr lang="en-US" dirty="0"/>
           </a:p>
@@ -4662,7 +4665,7 @@
             <a:fld id="{B61BEF0D-F0BB-DE4B-95CE-6DB70DBA9567}" type="datetimeFigureOut">
               <a:rPr lang="en-US" dirty="0"/>
               <a:pPr/>
-              <a:t>7/8/2017</a:t>
+              <a:t>7/12/2017</a:t>
             </a:fld>
             <a:endParaRPr lang="en-US" dirty="0"/>
           </a:p>
@@ -5004,7 +5007,7 @@
             <a:fld id="{B61BEF0D-F0BB-DE4B-95CE-6DB70DBA9567}" type="datetimeFigureOut">
               <a:rPr lang="en-US" dirty="0"/>
               <a:pPr/>
-              <a:t>7/8/2017</a:t>
+              <a:t>7/12/2017</a:t>
             </a:fld>
             <a:endParaRPr lang="en-US" dirty="0"/>
           </a:p>
@@ -7118,7 +7121,7 @@
             <a:fld id="{B61BEF0D-F0BB-DE4B-95CE-6DB70DBA9567}" type="datetimeFigureOut">
               <a:rPr lang="en-US" dirty="0"/>
               <a:pPr/>
-              <a:t>7/8/2017</a:t>
+              <a:t>7/12/2017</a:t>
             </a:fld>
             <a:endParaRPr lang="en-US" dirty="0"/>
           </a:p>
@@ -10235,40 +10238,43 @@
         </p:nvSpPr>
         <p:spPr/>
         <p:txBody>
-          <a:bodyPr/>
+          <a:bodyPr>
+            <a:normAutofit/>
+          </a:bodyPr>
           <a:lstStyle/>
           <a:p>
             <a:r>
-              <a:rPr lang="en-US" dirty="0"/>
+              <a:rPr lang="en-US" sz="2000" dirty="0"/>
               <a:t>The goal is to:</a:t>
             </a:r>
           </a:p>
           <a:p>
             <a:pPr lvl="1"/>
             <a:r>
-              <a:rPr lang="en-US" dirty="0"/>
-              <a:t>Provide easy access to technology in locations where use of technology is limited or discouraged.</a:t>
+              <a:rPr lang="en-US" sz="2000" dirty="0"/>
+              <a:t>Provide accessible, easy-to-use technology for the homeless and underserved to search for jobs and build wealth and reputation.</a:t>
             </a:r>
           </a:p>
           <a:p>
             <a:pPr lvl="1"/>
             <a:r>
-              <a:rPr lang="en-US" dirty="0"/>
-              <a:t>Provide a service to be able to easily put the homeless and underserved into contact with employers needing low-skilled labor.</a:t>
+              <a:rPr lang="en-US" sz="2000" dirty="0"/>
+              <a:t>Provide an Uber-</a:t>
+            </a:r>
+            <a:r>
+              <a:rPr lang="en-US" sz="2000" dirty="0" err="1"/>
+              <a:t>esque</a:t>
+            </a:r>
+            <a:r>
+              <a:rPr lang="en-US" sz="2000" dirty="0"/>
+              <a:t> review system that allows employers and employees to give ratings on a per job basis.</a:t>
             </a:r>
           </a:p>
           <a:p>
             <a:pPr lvl="1"/>
             <a:r>
-              <a:rPr lang="en-US" dirty="0"/>
-              <a:t>Provide a service to be able to help the individual save to be able to afford adequate housing.</a:t>
-            </a:r>
-          </a:p>
-          <a:p>
-            <a:pPr lvl="1"/>
-            <a:r>
-              <a:rPr lang="en-US" dirty="0"/>
-              <a:t>Create an easy-to-use interface with large buttons and text-to-speech functionality with support for multiple languages for the illiterate and non-English speakers</a:t>
+              <a:rPr lang="en-US" sz="2000" dirty="0"/>
+              <a:t>Providing underserved populations information on resources such as financial services, job fairs, community events, hygiene locations, etc.</a:t>
             </a:r>
           </a:p>
         </p:txBody>
@@ -10287,6 +10293,1624 @@
 </file>
 
 <file path=ppt/slides/slide4.xml><?xml version="1.0" encoding="utf-8"?>
+<p:sld xmlns:a="http://schemas.openxmlformats.org/drawingml/2006/main" xmlns:r="http://schemas.openxmlformats.org/officeDocument/2006/relationships" xmlns:p="http://schemas.openxmlformats.org/presentationml/2006/main">
+  <p:cSld>
+    <p:spTree>
+      <p:nvGrpSpPr>
+        <p:cNvPr id="1" name=""/>
+        <p:cNvGrpSpPr/>
+        <p:nvPr/>
+      </p:nvGrpSpPr>
+      <p:grpSpPr>
+        <a:xfrm>
+          <a:off x="0" y="0"/>
+          <a:ext cx="0" cy="0"/>
+          <a:chOff x="0" y="0"/>
+          <a:chExt cx="0" cy="0"/>
+        </a:xfrm>
+      </p:grpSpPr>
+      <p:sp>
+        <p:nvSpPr>
+          <p:cNvPr id="2" name="Title 1">
+            <a:extLst>
+              <a:ext uri="{FF2B5EF4-FFF2-40B4-BE49-F238E27FC236}">
+                <a16:creationId xmlns:a16="http://schemas.microsoft.com/office/drawing/2014/main" id="{DCFBF0DA-3B30-4A5F-B31F-7642BCD56B95}"/>
+              </a:ext>
+            </a:extLst>
+          </p:cNvPr>
+          <p:cNvSpPr>
+            <a:spLocks noGrp="1"/>
+          </p:cNvSpPr>
+          <p:nvPr>
+            <p:ph type="title"/>
+          </p:nvPr>
+        </p:nvSpPr>
+        <p:spPr/>
+        <p:txBody>
+          <a:bodyPr/>
+          <a:lstStyle/>
+          <a:p>
+            <a:r>
+              <a:rPr lang="en-US" dirty="0"/>
+              <a:t>Our Team Structure</a:t>
+            </a:r>
+          </a:p>
+        </p:txBody>
+      </p:sp>
+      <p:sp>
+        <p:nvSpPr>
+          <p:cNvPr id="3" name="Content Placeholder 2">
+            <a:extLst>
+              <a:ext uri="{FF2B5EF4-FFF2-40B4-BE49-F238E27FC236}">
+                <a16:creationId xmlns:a16="http://schemas.microsoft.com/office/drawing/2014/main" id="{882580B5-6205-447B-AA49-DB39326F9748}"/>
+              </a:ext>
+            </a:extLst>
+          </p:cNvPr>
+          <p:cNvSpPr>
+            <a:spLocks noGrp="1"/>
+          </p:cNvSpPr>
+          <p:nvPr>
+            <p:ph idx="1"/>
+          </p:nvPr>
+        </p:nvSpPr>
+        <p:spPr/>
+        <p:txBody>
+          <a:bodyPr/>
+          <a:lstStyle/>
+          <a:p>
+            <a:r>
+              <a:rPr lang="en-US" dirty="0"/>
+              <a:t>Backend Server:</a:t>
+            </a:r>
+          </a:p>
+          <a:p>
+            <a:pPr lvl="1"/>
+            <a:r>
+              <a:rPr lang="en-US" dirty="0" err="1"/>
+              <a:t>Takondwa</a:t>
+            </a:r>
+            <a:r>
+              <a:rPr lang="en-US" dirty="0"/>
+              <a:t> </a:t>
+            </a:r>
+            <a:r>
+              <a:rPr lang="en-US" dirty="0" err="1"/>
+              <a:t>Kakusa</a:t>
+            </a:r>
+            <a:endParaRPr lang="en-US" dirty="0"/>
+          </a:p>
+          <a:p>
+            <a:r>
+              <a:rPr lang="en-US" dirty="0"/>
+              <a:t>Website / UI Design</a:t>
+            </a:r>
+          </a:p>
+          <a:p>
+            <a:pPr lvl="1"/>
+            <a:r>
+              <a:rPr lang="en-US" dirty="0"/>
+              <a:t>James Shao</a:t>
+            </a:r>
+          </a:p>
+          <a:p>
+            <a:r>
+              <a:rPr lang="en-US" dirty="0"/>
+              <a:t>Android Development</a:t>
+            </a:r>
+          </a:p>
+          <a:p>
+            <a:pPr lvl="1"/>
+            <a:r>
+              <a:rPr lang="en-US" dirty="0"/>
+              <a:t>Hailey Hultquist</a:t>
+            </a:r>
+          </a:p>
+          <a:p>
+            <a:r>
+              <a:rPr lang="en-US" dirty="0"/>
+              <a:t>Embedded Devices</a:t>
+            </a:r>
+          </a:p>
+          <a:p>
+            <a:pPr lvl="1"/>
+            <a:r>
+              <a:rPr lang="en-US" dirty="0"/>
+              <a:t>Cameron West</a:t>
+            </a:r>
+          </a:p>
+        </p:txBody>
+      </p:sp>
+    </p:spTree>
+    <p:extLst>
+      <p:ext uri="{BB962C8B-B14F-4D97-AF65-F5344CB8AC3E}">
+        <p14:creationId xmlns:p14="http://schemas.microsoft.com/office/powerpoint/2010/main" val="4210373610"/>
+      </p:ext>
+    </p:extLst>
+  </p:cSld>
+  <p:clrMapOvr>
+    <a:masterClrMapping/>
+  </p:clrMapOvr>
+</p:sld>
+</file>
+
+<file path=ppt/slides/slide5.xml><?xml version="1.0" encoding="utf-8"?>
+<p:sld xmlns:a="http://schemas.openxmlformats.org/drawingml/2006/main" xmlns:r="http://schemas.openxmlformats.org/officeDocument/2006/relationships" xmlns:p="http://schemas.openxmlformats.org/presentationml/2006/main">
+  <p:cSld>
+    <p:spTree>
+      <p:nvGrpSpPr>
+        <p:cNvPr id="1" name=""/>
+        <p:cNvGrpSpPr/>
+        <p:nvPr/>
+      </p:nvGrpSpPr>
+      <p:grpSpPr>
+        <a:xfrm>
+          <a:off x="0" y="0"/>
+          <a:ext cx="0" cy="0"/>
+          <a:chOff x="0" y="0"/>
+          <a:chExt cx="0" cy="0"/>
+        </a:xfrm>
+      </p:grpSpPr>
+      <p:sp>
+        <p:nvSpPr>
+          <p:cNvPr id="2" name="Title 1">
+            <a:extLst>
+              <a:ext uri="{FF2B5EF4-FFF2-40B4-BE49-F238E27FC236}">
+                <a16:creationId xmlns:a16="http://schemas.microsoft.com/office/drawing/2014/main" id="{6EF01772-74A5-4F3B-859A-1932C24C2E78}"/>
+              </a:ext>
+            </a:extLst>
+          </p:cNvPr>
+          <p:cNvSpPr>
+            <a:spLocks noGrp="1"/>
+          </p:cNvSpPr>
+          <p:nvPr>
+            <p:ph type="title"/>
+          </p:nvPr>
+        </p:nvSpPr>
+        <p:spPr/>
+        <p:txBody>
+          <a:bodyPr/>
+          <a:lstStyle/>
+          <a:p>
+            <a:r>
+              <a:rPr lang="en-US" dirty="0"/>
+              <a:t>Our Implementation</a:t>
+            </a:r>
+          </a:p>
+        </p:txBody>
+      </p:sp>
+      <p:sp>
+        <p:nvSpPr>
+          <p:cNvPr id="3" name="Content Placeholder 2">
+            <a:extLst>
+              <a:ext uri="{FF2B5EF4-FFF2-40B4-BE49-F238E27FC236}">
+                <a16:creationId xmlns:a16="http://schemas.microsoft.com/office/drawing/2014/main" id="{934A9DDA-E498-49DF-9723-3103137B38B3}"/>
+              </a:ext>
+            </a:extLst>
+          </p:cNvPr>
+          <p:cNvSpPr>
+            <a:spLocks noGrp="1"/>
+          </p:cNvSpPr>
+          <p:nvPr>
+            <p:ph idx="1"/>
+          </p:nvPr>
+        </p:nvSpPr>
+        <p:spPr/>
+        <p:txBody>
+          <a:bodyPr/>
+          <a:lstStyle/>
+          <a:p>
+            <a:r>
+              <a:rPr lang="en-US" dirty="0"/>
+              <a:t>Backend</a:t>
+            </a:r>
+          </a:p>
+          <a:p>
+            <a:pPr lvl="1"/>
+            <a:r>
+              <a:rPr lang="en-US" dirty="0"/>
+              <a:t>Used </a:t>
+            </a:r>
+            <a:r>
+              <a:rPr lang="en-US" b="1" dirty="0"/>
+              <a:t>Django</a:t>
+            </a:r>
+            <a:r>
+              <a:rPr lang="en-US" dirty="0"/>
+              <a:t> framework which utilizes an SQLite database.</a:t>
+            </a:r>
+          </a:p>
+          <a:p>
+            <a:r>
+              <a:rPr lang="en-US" dirty="0"/>
+              <a:t>Frontend</a:t>
+            </a:r>
+          </a:p>
+          <a:p>
+            <a:pPr lvl="1"/>
+            <a:r>
+              <a:rPr lang="en-US" dirty="0"/>
+              <a:t>Used the </a:t>
+            </a:r>
+            <a:r>
+              <a:rPr lang="en-US" b="1" dirty="0"/>
+              <a:t>Foundation</a:t>
+            </a:r>
+            <a:r>
+              <a:rPr lang="en-US" dirty="0"/>
+              <a:t> framework with jQuery and Sass styling.</a:t>
+            </a:r>
+          </a:p>
+          <a:p>
+            <a:r>
+              <a:rPr lang="en-US" dirty="0"/>
+              <a:t>Android Development</a:t>
+            </a:r>
+          </a:p>
+          <a:p>
+            <a:pPr lvl="1"/>
+            <a:r>
+              <a:rPr lang="en-US" dirty="0"/>
+              <a:t>Developed in </a:t>
+            </a:r>
+            <a:r>
+              <a:rPr lang="en-US" b="1" dirty="0"/>
+              <a:t>Android Studio</a:t>
+            </a:r>
+            <a:r>
+              <a:rPr lang="en-US" dirty="0"/>
+              <a:t> to create a prototype app.</a:t>
+            </a:r>
+          </a:p>
+          <a:p>
+            <a:r>
+              <a:rPr lang="en-US" dirty="0"/>
+              <a:t>Embedded Devices</a:t>
+            </a:r>
+          </a:p>
+          <a:p>
+            <a:pPr lvl="1"/>
+            <a:r>
+              <a:rPr lang="en-US" dirty="0"/>
+              <a:t>Researched ability to use </a:t>
+            </a:r>
+            <a:r>
+              <a:rPr lang="en-US" b="1" dirty="0" err="1"/>
+              <a:t>DragonBoard</a:t>
+            </a:r>
+            <a:r>
+              <a:rPr lang="en-US" dirty="0"/>
+              <a:t> to serve as the </a:t>
+            </a:r>
+            <a:r>
+              <a:rPr lang="en-US" dirty="0" err="1"/>
+              <a:t>Qiosk</a:t>
+            </a:r>
+            <a:r>
+              <a:rPr lang="en-US" dirty="0"/>
+              <a:t> main computer and to provide facial recognition services.</a:t>
+            </a:r>
+          </a:p>
+          <a:p>
+            <a:endParaRPr lang="en-US" dirty="0"/>
+          </a:p>
+        </p:txBody>
+      </p:sp>
+    </p:spTree>
+    <p:extLst>
+      <p:ext uri="{BB962C8B-B14F-4D97-AF65-F5344CB8AC3E}">
+        <p14:creationId xmlns:p14="http://schemas.microsoft.com/office/powerpoint/2010/main" val="2535921982"/>
+      </p:ext>
+    </p:extLst>
+  </p:cSld>
+  <p:clrMapOvr>
+    <a:masterClrMapping/>
+  </p:clrMapOvr>
+</p:sld>
+</file>
+
+<file path=ppt/slides/slide6.xml><?xml version="1.0" encoding="utf-8"?>
+<p:sld xmlns:a="http://schemas.openxmlformats.org/drawingml/2006/main" xmlns:r="http://schemas.openxmlformats.org/officeDocument/2006/relationships" xmlns:p="http://schemas.openxmlformats.org/presentationml/2006/main">
+  <p:cSld>
+    <p:spTree>
+      <p:nvGrpSpPr>
+        <p:cNvPr id="1" name=""/>
+        <p:cNvGrpSpPr/>
+        <p:nvPr/>
+      </p:nvGrpSpPr>
+      <p:grpSpPr>
+        <a:xfrm>
+          <a:off x="0" y="0"/>
+          <a:ext cx="0" cy="0"/>
+          <a:chOff x="0" y="0"/>
+          <a:chExt cx="0" cy="0"/>
+        </a:xfrm>
+      </p:grpSpPr>
+      <p:sp useBgFill="1">
+        <p:nvSpPr>
+          <p:cNvPr id="8" name="Rectangle 7">
+            <a:extLst/>
+          </p:cNvPr>
+          <p:cNvSpPr>
+            <a:spLocks noGrp="1" noRot="1" noChangeAspect="1" noMove="1" noResize="1" noEditPoints="1" noAdjustHandles="1" noChangeArrowheads="1" noChangeShapeType="1" noTextEdit="1"/>
+          </p:cNvSpPr>
+          <p:nvPr>
+            <p:extLst>
+              <p:ext uri="{386F3935-93C4-4BCD-93E2-E3B085C9AB24}">
+                <p16:designElem xmlns:p16="http://schemas.microsoft.com/office/powerpoint/2015/main" val="1"/>
+              </p:ext>
+            </p:extLst>
+          </p:nvPr>
+        </p:nvSpPr>
+        <p:spPr>
+          <a:xfrm>
+            <a:off x="2" y="0"/>
+            <a:ext cx="12191998" cy="6858000"/>
+          </a:xfrm>
+          <a:prstGeom prst="rect">
+            <a:avLst/>
+          </a:prstGeom>
+          <a:ln>
+            <a:noFill/>
+          </a:ln>
+        </p:spPr>
+        <p:style>
+          <a:lnRef idx="2">
+            <a:schemeClr val="accent1">
+              <a:shade val="50000"/>
+            </a:schemeClr>
+          </a:lnRef>
+          <a:fillRef idx="1">
+            <a:schemeClr val="accent1"/>
+          </a:fillRef>
+          <a:effectRef idx="0">
+            <a:schemeClr val="accent1"/>
+          </a:effectRef>
+          <a:fontRef idx="minor">
+            <a:schemeClr val="lt1"/>
+          </a:fontRef>
+        </p:style>
+        <p:txBody>
+          <a:bodyPr rtlCol="0" anchor="ctr"/>
+          <a:lstStyle/>
+          <a:p>
+            <a:pPr algn="ctr"/>
+            <a:endParaRPr lang="en-US"/>
+          </a:p>
+        </p:txBody>
+      </p:sp>
+      <p:grpSp>
+        <p:nvGrpSpPr>
+          <p:cNvPr id="10" name="Group 9">
+            <a:extLst/>
+          </p:cNvPr>
+          <p:cNvGrpSpPr>
+            <a:grpSpLocks noGrp="1" noUngrp="1" noRot="1" noChangeAspect="1" noMove="1" noResize="1"/>
+          </p:cNvGrpSpPr>
+          <p:nvPr>
+            <p:extLst>
+              <p:ext uri="{386F3935-93C4-4BCD-93E2-E3B085C9AB24}">
+                <p16:designElem xmlns:p16="http://schemas.microsoft.com/office/powerpoint/2015/main" val="1"/>
+              </p:ext>
+            </p:extLst>
+          </p:nvPr>
+        </p:nvGrpSpPr>
+        <p:grpSpPr>
+          <a:xfrm flipH="1">
+            <a:off x="6009967" y="0"/>
+            <a:ext cx="6176982" cy="6853245"/>
+            <a:chOff x="2487613" y="285750"/>
+            <a:chExt cx="2428876" cy="5654676"/>
+          </a:xfrm>
+          <a:solidFill>
+            <a:schemeClr val="bg1">
+              <a:alpha val="30000"/>
+            </a:schemeClr>
+          </a:solidFill>
+        </p:grpSpPr>
+        <p:sp>
+          <p:nvSpPr>
+            <p:cNvPr id="11" name="Freeform 11">
+              <a:extLst/>
+            </p:cNvPr>
+            <p:cNvSpPr/>
+            <p:nvPr>
+              <p:extLst>
+                <p:ext uri="{386F3935-93C4-4BCD-93E2-E3B085C9AB24}">
+                  <p16:designElem xmlns:p16="http://schemas.microsoft.com/office/powerpoint/2015/main" val="1"/>
+                </p:ext>
+              </p:extLst>
+            </p:nvPr>
+          </p:nvSpPr>
+          <p:spPr bwMode="auto">
+            <a:xfrm>
+              <a:off x="2487613" y="2284413"/>
+              <a:ext cx="85725" cy="533400"/>
+            </a:xfrm>
+            <a:custGeom>
+              <a:avLst/>
+              <a:gdLst/>
+              <a:ahLst/>
+              <a:cxnLst/>
+              <a:rect l="0" t="0" r="r" b="b"/>
+              <a:pathLst>
+                <a:path w="22" h="136">
+                  <a:moveTo>
+                    <a:pt x="22" y="136"/>
+                  </a:moveTo>
+                  <a:cubicBezTo>
+                    <a:pt x="20" y="117"/>
+                    <a:pt x="19" y="99"/>
+                    <a:pt x="17" y="80"/>
+                  </a:cubicBezTo>
+                  <a:cubicBezTo>
+                    <a:pt x="11" y="54"/>
+                    <a:pt x="6" y="27"/>
+                    <a:pt x="0" y="0"/>
+                  </a:cubicBezTo>
+                  <a:cubicBezTo>
+                    <a:pt x="0" y="35"/>
+                    <a:pt x="0" y="35"/>
+                    <a:pt x="0" y="35"/>
+                  </a:cubicBezTo>
+                  <a:cubicBezTo>
+                    <a:pt x="6" y="64"/>
+                    <a:pt x="13" y="94"/>
+                    <a:pt x="20" y="124"/>
+                  </a:cubicBezTo>
+                  <a:cubicBezTo>
+                    <a:pt x="20" y="128"/>
+                    <a:pt x="21" y="132"/>
+                    <a:pt x="22" y="136"/>
+                  </a:cubicBezTo>
+                  <a:close/>
+                </a:path>
+              </a:pathLst>
+            </a:custGeom>
+            <a:grpFill/>
+            <a:ln>
+              <a:noFill/>
+            </a:ln>
+          </p:spPr>
+        </p:sp>
+        <p:sp>
+          <p:nvSpPr>
+            <p:cNvPr id="12" name="Freeform 12">
+              <a:extLst/>
+            </p:cNvPr>
+            <p:cNvSpPr/>
+            <p:nvPr>
+              <p:extLst>
+                <p:ext uri="{386F3935-93C4-4BCD-93E2-E3B085C9AB24}">
+                  <p16:designElem xmlns:p16="http://schemas.microsoft.com/office/powerpoint/2015/main" val="1"/>
+                </p:ext>
+              </p:extLst>
+            </p:nvPr>
+          </p:nvSpPr>
+          <p:spPr bwMode="auto">
+            <a:xfrm>
+              <a:off x="2597151" y="2779713"/>
+              <a:ext cx="550863" cy="1978025"/>
+            </a:xfrm>
+            <a:custGeom>
+              <a:avLst/>
+              <a:gdLst/>
+              <a:ahLst/>
+              <a:cxnLst/>
+              <a:rect l="0" t="0" r="r" b="b"/>
+              <a:pathLst>
+                <a:path w="140" h="504">
+                  <a:moveTo>
+                    <a:pt x="86" y="350"/>
+                  </a:moveTo>
+                  <a:cubicBezTo>
+                    <a:pt x="103" y="402"/>
+                    <a:pt x="120" y="453"/>
+                    <a:pt x="139" y="504"/>
+                  </a:cubicBezTo>
+                  <a:cubicBezTo>
+                    <a:pt x="139" y="495"/>
+                    <a:pt x="139" y="487"/>
+                    <a:pt x="140" y="478"/>
+                  </a:cubicBezTo>
+                  <a:cubicBezTo>
+                    <a:pt x="124" y="435"/>
+                    <a:pt x="109" y="391"/>
+                    <a:pt x="95" y="347"/>
+                  </a:cubicBezTo>
+                  <a:cubicBezTo>
+                    <a:pt x="58" y="233"/>
+                    <a:pt x="27" y="117"/>
+                    <a:pt x="0" y="0"/>
+                  </a:cubicBezTo>
+                  <a:cubicBezTo>
+                    <a:pt x="2" y="20"/>
+                    <a:pt x="4" y="41"/>
+                    <a:pt x="6" y="61"/>
+                  </a:cubicBezTo>
+                  <a:cubicBezTo>
+                    <a:pt x="30" y="158"/>
+                    <a:pt x="56" y="255"/>
+                    <a:pt x="86" y="350"/>
+                  </a:cubicBezTo>
+                  <a:close/>
+                </a:path>
+              </a:pathLst>
+            </a:custGeom>
+            <a:grpFill/>
+            <a:ln>
+              <a:noFill/>
+            </a:ln>
+          </p:spPr>
+        </p:sp>
+        <p:sp>
+          <p:nvSpPr>
+            <p:cNvPr id="13" name="Freeform 13">
+              <a:extLst/>
+            </p:cNvPr>
+            <p:cNvSpPr/>
+            <p:nvPr>
+              <p:extLst>
+                <p:ext uri="{386F3935-93C4-4BCD-93E2-E3B085C9AB24}">
+                  <p16:designElem xmlns:p16="http://schemas.microsoft.com/office/powerpoint/2015/main" val="1"/>
+                </p:ext>
+              </p:extLst>
+            </p:nvPr>
+          </p:nvSpPr>
+          <p:spPr bwMode="auto">
+            <a:xfrm>
+              <a:off x="3175001" y="4730750"/>
+              <a:ext cx="519113" cy="1209675"/>
+            </a:xfrm>
+            <a:custGeom>
+              <a:avLst/>
+              <a:gdLst/>
+              <a:ahLst/>
+              <a:cxnLst/>
+              <a:rect l="0" t="0" r="r" b="b"/>
+              <a:pathLst>
+                <a:path w="132" h="308">
+                  <a:moveTo>
+                    <a:pt x="8" y="22"/>
+                  </a:moveTo>
+                  <a:cubicBezTo>
+                    <a:pt x="5" y="15"/>
+                    <a:pt x="2" y="8"/>
+                    <a:pt x="0" y="0"/>
+                  </a:cubicBezTo>
+                  <a:cubicBezTo>
+                    <a:pt x="0" y="10"/>
+                    <a:pt x="0" y="19"/>
+                    <a:pt x="0" y="29"/>
+                  </a:cubicBezTo>
+                  <a:cubicBezTo>
+                    <a:pt x="21" y="85"/>
+                    <a:pt x="44" y="140"/>
+                    <a:pt x="68" y="194"/>
+                  </a:cubicBezTo>
+                  <a:cubicBezTo>
+                    <a:pt x="85" y="232"/>
+                    <a:pt x="104" y="270"/>
+                    <a:pt x="123" y="308"/>
+                  </a:cubicBezTo>
+                  <a:cubicBezTo>
+                    <a:pt x="132" y="308"/>
+                    <a:pt x="132" y="308"/>
+                    <a:pt x="132" y="308"/>
+                  </a:cubicBezTo>
+                  <a:cubicBezTo>
+                    <a:pt x="113" y="269"/>
+                    <a:pt x="94" y="230"/>
+                    <a:pt x="77" y="190"/>
+                  </a:cubicBezTo>
+                  <a:cubicBezTo>
+                    <a:pt x="52" y="135"/>
+                    <a:pt x="29" y="79"/>
+                    <a:pt x="8" y="22"/>
+                  </a:cubicBezTo>
+                  <a:close/>
+                </a:path>
+              </a:pathLst>
+            </a:custGeom>
+            <a:grpFill/>
+            <a:ln>
+              <a:noFill/>
+            </a:ln>
+          </p:spPr>
+        </p:sp>
+        <p:sp>
+          <p:nvSpPr>
+            <p:cNvPr id="14" name="Freeform 14">
+              <a:extLst/>
+            </p:cNvPr>
+            <p:cNvSpPr/>
+            <p:nvPr>
+              <p:extLst>
+                <p:ext uri="{386F3935-93C4-4BCD-93E2-E3B085C9AB24}">
+                  <p16:designElem xmlns:p16="http://schemas.microsoft.com/office/powerpoint/2015/main" val="1"/>
+                </p:ext>
+              </p:extLst>
+            </p:nvPr>
+          </p:nvSpPr>
+          <p:spPr bwMode="auto">
+            <a:xfrm>
+              <a:off x="3305176" y="5630863"/>
+              <a:ext cx="146050" cy="309563"/>
+            </a:xfrm>
+            <a:custGeom>
+              <a:avLst/>
+              <a:gdLst/>
+              <a:ahLst/>
+              <a:cxnLst/>
+              <a:rect l="0" t="0" r="r" b="b"/>
+              <a:pathLst>
+                <a:path w="37" h="79">
+                  <a:moveTo>
+                    <a:pt x="28" y="79"/>
+                  </a:moveTo>
+                  <a:cubicBezTo>
+                    <a:pt x="37" y="79"/>
+                    <a:pt x="37" y="79"/>
+                    <a:pt x="37" y="79"/>
+                  </a:cubicBezTo>
+                  <a:cubicBezTo>
+                    <a:pt x="24" y="53"/>
+                    <a:pt x="12" y="27"/>
+                    <a:pt x="0" y="0"/>
+                  </a:cubicBezTo>
+                  <a:cubicBezTo>
+                    <a:pt x="8" y="27"/>
+                    <a:pt x="17" y="53"/>
+                    <a:pt x="28" y="79"/>
+                  </a:cubicBezTo>
+                  <a:close/>
+                </a:path>
+              </a:pathLst>
+            </a:custGeom>
+            <a:grpFill/>
+            <a:ln>
+              <a:noFill/>
+            </a:ln>
+          </p:spPr>
+        </p:sp>
+        <p:sp>
+          <p:nvSpPr>
+            <p:cNvPr id="15" name="Freeform 15">
+              <a:extLst/>
+            </p:cNvPr>
+            <p:cNvSpPr/>
+            <p:nvPr>
+              <p:extLst>
+                <p:ext uri="{386F3935-93C4-4BCD-93E2-E3B085C9AB24}">
+                  <p16:designElem xmlns:p16="http://schemas.microsoft.com/office/powerpoint/2015/main" val="1"/>
+                </p:ext>
+              </p:extLst>
+            </p:nvPr>
+          </p:nvSpPr>
+          <p:spPr bwMode="auto">
+            <a:xfrm>
+              <a:off x="2573338" y="2817813"/>
+              <a:ext cx="700088" cy="2835275"/>
+            </a:xfrm>
+            <a:custGeom>
+              <a:avLst/>
+              <a:gdLst/>
+              <a:ahLst/>
+              <a:cxnLst/>
+              <a:rect l="0" t="0" r="r" b="b"/>
+              <a:pathLst>
+                <a:path w="178" h="722">
+                  <a:moveTo>
+                    <a:pt x="162" y="660"/>
+                  </a:moveTo>
+                  <a:cubicBezTo>
+                    <a:pt x="145" y="618"/>
+                    <a:pt x="130" y="576"/>
+                    <a:pt x="116" y="534"/>
+                  </a:cubicBezTo>
+                  <a:cubicBezTo>
+                    <a:pt x="84" y="437"/>
+                    <a:pt x="59" y="337"/>
+                    <a:pt x="40" y="236"/>
+                  </a:cubicBezTo>
+                  <a:cubicBezTo>
+                    <a:pt x="29" y="175"/>
+                    <a:pt x="20" y="113"/>
+                    <a:pt x="12" y="51"/>
+                  </a:cubicBezTo>
+                  <a:cubicBezTo>
+                    <a:pt x="8" y="34"/>
+                    <a:pt x="4" y="17"/>
+                    <a:pt x="0" y="0"/>
+                  </a:cubicBezTo>
+                  <a:cubicBezTo>
+                    <a:pt x="8" y="79"/>
+                    <a:pt x="19" y="159"/>
+                    <a:pt x="33" y="237"/>
+                  </a:cubicBezTo>
+                  <a:cubicBezTo>
+                    <a:pt x="51" y="339"/>
+                    <a:pt x="76" y="439"/>
+                    <a:pt x="107" y="537"/>
+                  </a:cubicBezTo>
+                  <a:cubicBezTo>
+                    <a:pt x="123" y="586"/>
+                    <a:pt x="141" y="634"/>
+                    <a:pt x="160" y="681"/>
+                  </a:cubicBezTo>
+                  <a:cubicBezTo>
+                    <a:pt x="166" y="695"/>
+                    <a:pt x="172" y="708"/>
+                    <a:pt x="178" y="722"/>
+                  </a:cubicBezTo>
+                  <a:cubicBezTo>
+                    <a:pt x="176" y="717"/>
+                    <a:pt x="175" y="713"/>
+                    <a:pt x="174" y="708"/>
+                  </a:cubicBezTo>
+                  <a:cubicBezTo>
+                    <a:pt x="169" y="692"/>
+                    <a:pt x="165" y="676"/>
+                    <a:pt x="162" y="660"/>
+                  </a:cubicBezTo>
+                  <a:close/>
+                </a:path>
+              </a:pathLst>
+            </a:custGeom>
+            <a:grpFill/>
+            <a:ln>
+              <a:noFill/>
+            </a:ln>
+          </p:spPr>
+        </p:sp>
+        <p:sp>
+          <p:nvSpPr>
+            <p:cNvPr id="16" name="Freeform 16">
+              <a:extLst/>
+            </p:cNvPr>
+            <p:cNvSpPr/>
+            <p:nvPr>
+              <p:extLst>
+                <p:ext uri="{386F3935-93C4-4BCD-93E2-E3B085C9AB24}">
+                  <p16:designElem xmlns:p16="http://schemas.microsoft.com/office/powerpoint/2015/main" val="1"/>
+                </p:ext>
+              </p:extLst>
+            </p:nvPr>
+          </p:nvSpPr>
+          <p:spPr bwMode="auto">
+            <a:xfrm>
+              <a:off x="2506663" y="285750"/>
+              <a:ext cx="90488" cy="2493963"/>
+            </a:xfrm>
+            <a:custGeom>
+              <a:avLst/>
+              <a:gdLst/>
+              <a:ahLst/>
+              <a:cxnLst/>
+              <a:rect l="0" t="0" r="r" b="b"/>
+              <a:pathLst>
+                <a:path w="23" h="635">
+                  <a:moveTo>
+                    <a:pt x="11" y="577"/>
+                  </a:moveTo>
+                  <a:cubicBezTo>
+                    <a:pt x="12" y="581"/>
+                    <a:pt x="12" y="585"/>
+                    <a:pt x="12" y="589"/>
+                  </a:cubicBezTo>
+                  <a:cubicBezTo>
+                    <a:pt x="15" y="603"/>
+                    <a:pt x="19" y="617"/>
+                    <a:pt x="22" y="632"/>
+                  </a:cubicBezTo>
+                  <a:cubicBezTo>
+                    <a:pt x="22" y="633"/>
+                    <a:pt x="22" y="634"/>
+                    <a:pt x="23" y="635"/>
+                  </a:cubicBezTo>
+                  <a:cubicBezTo>
+                    <a:pt x="21" y="615"/>
+                    <a:pt x="19" y="596"/>
+                    <a:pt x="17" y="576"/>
+                  </a:cubicBezTo>
+                  <a:cubicBezTo>
+                    <a:pt x="9" y="474"/>
+                    <a:pt x="5" y="372"/>
+                    <a:pt x="5" y="269"/>
+                  </a:cubicBezTo>
+                  <a:cubicBezTo>
+                    <a:pt x="6" y="179"/>
+                    <a:pt x="9" y="90"/>
+                    <a:pt x="15" y="0"/>
+                  </a:cubicBezTo>
+                  <a:cubicBezTo>
+                    <a:pt x="12" y="0"/>
+                    <a:pt x="12" y="0"/>
+                    <a:pt x="12" y="0"/>
+                  </a:cubicBezTo>
+                  <a:cubicBezTo>
+                    <a:pt x="5" y="89"/>
+                    <a:pt x="2" y="179"/>
+                    <a:pt x="1" y="269"/>
+                  </a:cubicBezTo>
+                  <a:cubicBezTo>
+                    <a:pt x="0" y="372"/>
+                    <a:pt x="3" y="474"/>
+                    <a:pt x="11" y="577"/>
+                  </a:cubicBezTo>
+                  <a:close/>
+                </a:path>
+              </a:pathLst>
+            </a:custGeom>
+            <a:grpFill/>
+            <a:ln>
+              <a:noFill/>
+            </a:ln>
+          </p:spPr>
+        </p:sp>
+        <p:sp>
+          <p:nvSpPr>
+            <p:cNvPr id="17" name="Freeform 17">
+              <a:extLst/>
+            </p:cNvPr>
+            <p:cNvSpPr/>
+            <p:nvPr>
+              <p:extLst>
+                <p:ext uri="{386F3935-93C4-4BCD-93E2-E3B085C9AB24}">
+                  <p16:designElem xmlns:p16="http://schemas.microsoft.com/office/powerpoint/2015/main" val="1"/>
+                </p:ext>
+              </p:extLst>
+            </p:nvPr>
+          </p:nvSpPr>
+          <p:spPr bwMode="auto">
+            <a:xfrm>
+              <a:off x="2554288" y="2598738"/>
+              <a:ext cx="66675" cy="420688"/>
+            </a:xfrm>
+            <a:custGeom>
+              <a:avLst/>
+              <a:gdLst/>
+              <a:ahLst/>
+              <a:cxnLst/>
+              <a:rect l="0" t="0" r="r" b="b"/>
+              <a:pathLst>
+                <a:path w="17" h="107">
+                  <a:moveTo>
+                    <a:pt x="0" y="0"/>
+                  </a:moveTo>
+                  <a:cubicBezTo>
+                    <a:pt x="2" y="19"/>
+                    <a:pt x="3" y="37"/>
+                    <a:pt x="5" y="56"/>
+                  </a:cubicBezTo>
+                  <a:cubicBezTo>
+                    <a:pt x="9" y="73"/>
+                    <a:pt x="13" y="90"/>
+                    <a:pt x="17" y="107"/>
+                  </a:cubicBezTo>
+                  <a:cubicBezTo>
+                    <a:pt x="15" y="87"/>
+                    <a:pt x="13" y="66"/>
+                    <a:pt x="11" y="46"/>
+                  </a:cubicBezTo>
+                  <a:cubicBezTo>
+                    <a:pt x="10" y="45"/>
+                    <a:pt x="10" y="44"/>
+                    <a:pt x="10" y="43"/>
+                  </a:cubicBezTo>
+                  <a:cubicBezTo>
+                    <a:pt x="7" y="28"/>
+                    <a:pt x="3" y="14"/>
+                    <a:pt x="0" y="0"/>
+                  </a:cubicBezTo>
+                  <a:close/>
+                </a:path>
+              </a:pathLst>
+            </a:custGeom>
+            <a:grpFill/>
+            <a:ln>
+              <a:noFill/>
+            </a:ln>
+          </p:spPr>
+        </p:sp>
+        <p:sp>
+          <p:nvSpPr>
+            <p:cNvPr id="18" name="Freeform 18">
+              <a:extLst/>
+            </p:cNvPr>
+            <p:cNvSpPr/>
+            <p:nvPr>
+              <p:extLst>
+                <p:ext uri="{386F3935-93C4-4BCD-93E2-E3B085C9AB24}">
+                  <p16:designElem xmlns:p16="http://schemas.microsoft.com/office/powerpoint/2015/main" val="1"/>
+                </p:ext>
+              </p:extLst>
+            </p:nvPr>
+          </p:nvSpPr>
+          <p:spPr bwMode="auto">
+            <a:xfrm>
+              <a:off x="3143251" y="4757738"/>
+              <a:ext cx="161925" cy="873125"/>
+            </a:xfrm>
+            <a:custGeom>
+              <a:avLst/>
+              <a:gdLst/>
+              <a:ahLst/>
+              <a:cxnLst/>
+              <a:rect l="0" t="0" r="r" b="b"/>
+              <a:pathLst>
+                <a:path w="41" h="222">
+                  <a:moveTo>
+                    <a:pt x="0" y="0"/>
+                  </a:moveTo>
+                  <a:cubicBezTo>
+                    <a:pt x="0" y="31"/>
+                    <a:pt x="2" y="62"/>
+                    <a:pt x="5" y="93"/>
+                  </a:cubicBezTo>
+                  <a:cubicBezTo>
+                    <a:pt x="8" y="117"/>
+                    <a:pt x="12" y="142"/>
+                    <a:pt x="17" y="166"/>
+                  </a:cubicBezTo>
+                  <a:cubicBezTo>
+                    <a:pt x="19" y="172"/>
+                    <a:pt x="22" y="178"/>
+                    <a:pt x="24" y="184"/>
+                  </a:cubicBezTo>
+                  <a:cubicBezTo>
+                    <a:pt x="30" y="197"/>
+                    <a:pt x="35" y="209"/>
+                    <a:pt x="41" y="222"/>
+                  </a:cubicBezTo>
+                  <a:cubicBezTo>
+                    <a:pt x="40" y="219"/>
+                    <a:pt x="39" y="215"/>
+                    <a:pt x="38" y="212"/>
+                  </a:cubicBezTo>
+                  <a:cubicBezTo>
+                    <a:pt x="26" y="172"/>
+                    <a:pt x="18" y="132"/>
+                    <a:pt x="13" y="92"/>
+                  </a:cubicBezTo>
+                  <a:cubicBezTo>
+                    <a:pt x="11" y="68"/>
+                    <a:pt x="9" y="45"/>
+                    <a:pt x="8" y="22"/>
+                  </a:cubicBezTo>
+                  <a:cubicBezTo>
+                    <a:pt x="8" y="21"/>
+                    <a:pt x="7" y="20"/>
+                    <a:pt x="7" y="18"/>
+                  </a:cubicBezTo>
+                  <a:cubicBezTo>
+                    <a:pt x="5" y="12"/>
+                    <a:pt x="2" y="6"/>
+                    <a:pt x="0" y="0"/>
+                  </a:cubicBezTo>
+                  <a:close/>
+                </a:path>
+              </a:pathLst>
+            </a:custGeom>
+            <a:grpFill/>
+            <a:ln>
+              <a:noFill/>
+            </a:ln>
+          </p:spPr>
+        </p:sp>
+        <p:sp>
+          <p:nvSpPr>
+            <p:cNvPr id="19" name="Freeform 19">
+              <a:extLst/>
+            </p:cNvPr>
+            <p:cNvSpPr/>
+            <p:nvPr>
+              <p:extLst>
+                <p:ext uri="{386F3935-93C4-4BCD-93E2-E3B085C9AB24}">
+                  <p16:designElem xmlns:p16="http://schemas.microsoft.com/office/powerpoint/2015/main" val="1"/>
+                </p:ext>
+              </p:extLst>
+            </p:nvPr>
+          </p:nvSpPr>
+          <p:spPr bwMode="auto">
+            <a:xfrm>
+              <a:off x="3148014" y="468286"/>
+              <a:ext cx="1768475" cy="4262464"/>
+            </a:xfrm>
+            <a:custGeom>
+              <a:avLst/>
+              <a:gdLst/>
+              <a:ahLst/>
+              <a:cxnLst/>
+              <a:rect l="0" t="0" r="r" b="b"/>
+              <a:pathLst>
+                <a:path w="450" h="878">
+                  <a:moveTo>
+                    <a:pt x="7" y="854"/>
+                  </a:moveTo>
+                  <a:cubicBezTo>
+                    <a:pt x="10" y="772"/>
+                    <a:pt x="26" y="691"/>
+                    <a:pt x="50" y="613"/>
+                  </a:cubicBezTo>
+                  <a:cubicBezTo>
+                    <a:pt x="75" y="535"/>
+                    <a:pt x="109" y="460"/>
+                    <a:pt x="149" y="388"/>
+                  </a:cubicBezTo>
+                  <a:cubicBezTo>
+                    <a:pt x="189" y="316"/>
+                    <a:pt x="235" y="248"/>
+                    <a:pt x="285" y="183"/>
+                  </a:cubicBezTo>
+                  <a:cubicBezTo>
+                    <a:pt x="310" y="151"/>
+                    <a:pt x="337" y="119"/>
+                    <a:pt x="364" y="89"/>
+                  </a:cubicBezTo>
+                  <a:cubicBezTo>
+                    <a:pt x="378" y="74"/>
+                    <a:pt x="392" y="58"/>
+                    <a:pt x="406" y="44"/>
+                  </a:cubicBezTo>
+                  <a:cubicBezTo>
+                    <a:pt x="421" y="29"/>
+                    <a:pt x="435" y="15"/>
+                    <a:pt x="450" y="1"/>
+                  </a:cubicBezTo>
+                  <a:cubicBezTo>
+                    <a:pt x="450" y="0"/>
+                    <a:pt x="450" y="0"/>
+                    <a:pt x="450" y="0"/>
+                  </a:cubicBezTo>
+                  <a:cubicBezTo>
+                    <a:pt x="434" y="14"/>
+                    <a:pt x="420" y="28"/>
+                    <a:pt x="405" y="43"/>
+                  </a:cubicBezTo>
+                  <a:cubicBezTo>
+                    <a:pt x="391" y="57"/>
+                    <a:pt x="377" y="72"/>
+                    <a:pt x="363" y="88"/>
+                  </a:cubicBezTo>
+                  <a:cubicBezTo>
+                    <a:pt x="335" y="118"/>
+                    <a:pt x="308" y="149"/>
+                    <a:pt x="283" y="181"/>
+                  </a:cubicBezTo>
+                  <a:cubicBezTo>
+                    <a:pt x="232" y="246"/>
+                    <a:pt x="185" y="314"/>
+                    <a:pt x="145" y="386"/>
+                  </a:cubicBezTo>
+                  <a:cubicBezTo>
+                    <a:pt x="104" y="457"/>
+                    <a:pt x="70" y="533"/>
+                    <a:pt x="45" y="611"/>
+                  </a:cubicBezTo>
+                  <a:cubicBezTo>
+                    <a:pt x="19" y="690"/>
+                    <a:pt x="3" y="771"/>
+                    <a:pt x="0" y="854"/>
+                  </a:cubicBezTo>
+                  <a:cubicBezTo>
+                    <a:pt x="0" y="856"/>
+                    <a:pt x="0" y="857"/>
+                    <a:pt x="0" y="859"/>
+                  </a:cubicBezTo>
+                  <a:cubicBezTo>
+                    <a:pt x="2" y="865"/>
+                    <a:pt x="4" y="872"/>
+                    <a:pt x="7" y="878"/>
+                  </a:cubicBezTo>
+                  <a:cubicBezTo>
+                    <a:pt x="7" y="870"/>
+                    <a:pt x="7" y="862"/>
+                    <a:pt x="7" y="854"/>
+                  </a:cubicBezTo>
+                  <a:close/>
+                </a:path>
+              </a:pathLst>
+            </a:custGeom>
+            <a:grpFill/>
+            <a:ln>
+              <a:noFill/>
+            </a:ln>
+          </p:spPr>
+        </p:sp>
+        <p:sp>
+          <p:nvSpPr>
+            <p:cNvPr id="20" name="Freeform 20">
+              <a:extLst/>
+            </p:cNvPr>
+            <p:cNvSpPr/>
+            <p:nvPr>
+              <p:extLst>
+                <p:ext uri="{386F3935-93C4-4BCD-93E2-E3B085C9AB24}">
+                  <p16:designElem xmlns:p16="http://schemas.microsoft.com/office/powerpoint/2015/main" val="1"/>
+                </p:ext>
+              </p:extLst>
+            </p:nvPr>
+          </p:nvSpPr>
+          <p:spPr bwMode="auto">
+            <a:xfrm>
+              <a:off x="3273426" y="5653088"/>
+              <a:ext cx="138113" cy="287338"/>
+            </a:xfrm>
+            <a:custGeom>
+              <a:avLst/>
+              <a:gdLst/>
+              <a:ahLst/>
+              <a:cxnLst/>
+              <a:rect l="0" t="0" r="r" b="b"/>
+              <a:pathLst>
+                <a:path w="35" h="73">
+                  <a:moveTo>
+                    <a:pt x="0" y="0"/>
+                  </a:moveTo>
+                  <a:cubicBezTo>
+                    <a:pt x="7" y="24"/>
+                    <a:pt x="16" y="49"/>
+                    <a:pt x="26" y="73"/>
+                  </a:cubicBezTo>
+                  <a:cubicBezTo>
+                    <a:pt x="35" y="73"/>
+                    <a:pt x="35" y="73"/>
+                    <a:pt x="35" y="73"/>
+                  </a:cubicBezTo>
+                  <a:cubicBezTo>
+                    <a:pt x="23" y="49"/>
+                    <a:pt x="11" y="24"/>
+                    <a:pt x="0" y="0"/>
+                  </a:cubicBezTo>
+                  <a:close/>
+                </a:path>
+              </a:pathLst>
+            </a:custGeom>
+            <a:grpFill/>
+            <a:ln>
+              <a:noFill/>
+            </a:ln>
+          </p:spPr>
+        </p:sp>
+        <p:sp>
+          <p:nvSpPr>
+            <p:cNvPr id="21" name="Freeform 21">
+              <a:extLst/>
+            </p:cNvPr>
+            <p:cNvSpPr/>
+            <p:nvPr>
+              <p:extLst>
+                <p:ext uri="{386F3935-93C4-4BCD-93E2-E3B085C9AB24}">
+                  <p16:designElem xmlns:p16="http://schemas.microsoft.com/office/powerpoint/2015/main" val="1"/>
+                </p:ext>
+              </p:extLst>
+            </p:nvPr>
+          </p:nvSpPr>
+          <p:spPr bwMode="auto">
+            <a:xfrm>
+              <a:off x="3143251" y="4656138"/>
+              <a:ext cx="31750" cy="188913"/>
+            </a:xfrm>
+            <a:custGeom>
+              <a:avLst/>
+              <a:gdLst/>
+              <a:ahLst/>
+              <a:cxnLst/>
+              <a:rect l="0" t="0" r="r" b="b"/>
+              <a:pathLst>
+                <a:path w="8" h="48">
+                  <a:moveTo>
+                    <a:pt x="7" y="44"/>
+                  </a:moveTo>
+                  <a:cubicBezTo>
+                    <a:pt x="7" y="46"/>
+                    <a:pt x="8" y="47"/>
+                    <a:pt x="8" y="48"/>
+                  </a:cubicBezTo>
+                  <a:cubicBezTo>
+                    <a:pt x="8" y="38"/>
+                    <a:pt x="8" y="29"/>
+                    <a:pt x="8" y="19"/>
+                  </a:cubicBezTo>
+                  <a:cubicBezTo>
+                    <a:pt x="5" y="13"/>
+                    <a:pt x="3" y="6"/>
+                    <a:pt x="1" y="0"/>
+                  </a:cubicBezTo>
+                  <a:cubicBezTo>
+                    <a:pt x="0" y="9"/>
+                    <a:pt x="0" y="17"/>
+                    <a:pt x="0" y="26"/>
+                  </a:cubicBezTo>
+                  <a:cubicBezTo>
+                    <a:pt x="2" y="32"/>
+                    <a:pt x="5" y="38"/>
+                    <a:pt x="7" y="44"/>
+                  </a:cubicBezTo>
+                  <a:close/>
+                </a:path>
+              </a:pathLst>
+            </a:custGeom>
+            <a:grpFill/>
+            <a:ln>
+              <a:noFill/>
+            </a:ln>
+          </p:spPr>
+        </p:sp>
+        <p:sp>
+          <p:nvSpPr>
+            <p:cNvPr id="22" name="Freeform 22">
+              <a:extLst/>
+            </p:cNvPr>
+            <p:cNvSpPr/>
+            <p:nvPr>
+              <p:extLst>
+                <p:ext uri="{386F3935-93C4-4BCD-93E2-E3B085C9AB24}">
+                  <p16:designElem xmlns:p16="http://schemas.microsoft.com/office/powerpoint/2015/main" val="1"/>
+                </p:ext>
+              </p:extLst>
+            </p:nvPr>
+          </p:nvSpPr>
+          <p:spPr bwMode="auto">
+            <a:xfrm>
+              <a:off x="3211513" y="5410200"/>
+              <a:ext cx="203200" cy="530225"/>
+            </a:xfrm>
+            <a:custGeom>
+              <a:avLst/>
+              <a:gdLst/>
+              <a:ahLst/>
+              <a:cxnLst/>
+              <a:rect l="0" t="0" r="r" b="b"/>
+              <a:pathLst>
+                <a:path w="52" h="135">
+                  <a:moveTo>
+                    <a:pt x="7" y="18"/>
+                  </a:moveTo>
+                  <a:cubicBezTo>
+                    <a:pt x="5" y="12"/>
+                    <a:pt x="2" y="6"/>
+                    <a:pt x="0" y="0"/>
+                  </a:cubicBezTo>
+                  <a:cubicBezTo>
+                    <a:pt x="3" y="16"/>
+                    <a:pt x="7" y="32"/>
+                    <a:pt x="12" y="48"/>
+                  </a:cubicBezTo>
+                  <a:cubicBezTo>
+                    <a:pt x="13" y="53"/>
+                    <a:pt x="14" y="57"/>
+                    <a:pt x="16" y="62"/>
+                  </a:cubicBezTo>
+                  <a:cubicBezTo>
+                    <a:pt x="27" y="86"/>
+                    <a:pt x="39" y="111"/>
+                    <a:pt x="51" y="135"/>
+                  </a:cubicBezTo>
+                  <a:cubicBezTo>
+                    <a:pt x="52" y="135"/>
+                    <a:pt x="52" y="135"/>
+                    <a:pt x="52" y="135"/>
+                  </a:cubicBezTo>
+                  <a:cubicBezTo>
+                    <a:pt x="41" y="109"/>
+                    <a:pt x="32" y="83"/>
+                    <a:pt x="24" y="56"/>
+                  </a:cubicBezTo>
+                  <a:cubicBezTo>
+                    <a:pt x="18" y="43"/>
+                    <a:pt x="13" y="31"/>
+                    <a:pt x="7" y="18"/>
+                  </a:cubicBezTo>
+                  <a:close/>
+                </a:path>
+              </a:pathLst>
+            </a:custGeom>
+            <a:grpFill/>
+            <a:ln>
+              <a:noFill/>
+            </a:ln>
+          </p:spPr>
+        </p:sp>
+      </p:grpSp>
+      <p:cxnSp>
+        <p:nvCxnSpPr>
+          <p:cNvPr id="24" name="Straight Connector 23">
+            <a:extLst/>
+          </p:cNvPr>
+          <p:cNvCxnSpPr>
+            <a:cxnSpLocks noGrp="1" noRot="1" noChangeAspect="1" noMove="1" noResize="1" noEditPoints="1" noAdjustHandles="1" noChangeArrowheads="1" noChangeShapeType="1"/>
+          </p:cNvCxnSpPr>
+          <p:nvPr>
+            <p:extLst>
+              <p:ext uri="{386F3935-93C4-4BCD-93E2-E3B085C9AB24}">
+                <p16:designElem xmlns:p16="http://schemas.microsoft.com/office/powerpoint/2015/main" val="1"/>
+              </p:ext>
+            </p:extLst>
+          </p:nvPr>
+        </p:nvCxnSpPr>
+        <p:spPr>
+          <a:xfrm>
+            <a:off x="4654296" y="1871831"/>
+            <a:ext cx="0" cy="3200400"/>
+          </a:xfrm>
+          <a:prstGeom prst="line">
+            <a:avLst/>
+          </a:prstGeom>
+          <a:ln w="15875">
+            <a:solidFill>
+              <a:schemeClr val="accent4"/>
+            </a:solidFill>
+          </a:ln>
+        </p:spPr>
+        <p:style>
+          <a:lnRef idx="1">
+            <a:schemeClr val="accent1"/>
+          </a:lnRef>
+          <a:fillRef idx="0">
+            <a:schemeClr val="accent1"/>
+          </a:fillRef>
+          <a:effectRef idx="0">
+            <a:schemeClr val="accent1"/>
+          </a:effectRef>
+          <a:fontRef idx="minor">
+            <a:schemeClr val="tx1"/>
+          </a:fontRef>
+        </p:style>
+      </p:cxnSp>
+      <p:sp>
+        <p:nvSpPr>
+          <p:cNvPr id="26" name="Rectangle 25">
+            <a:extLst/>
+          </p:cNvPr>
+          <p:cNvSpPr>
+            <a:spLocks noGrp="1" noRot="1" noChangeAspect="1" noMove="1" noResize="1" noEditPoints="1" noAdjustHandles="1" noChangeArrowheads="1" noChangeShapeType="1" noTextEdit="1"/>
+          </p:cNvSpPr>
+          <p:nvPr>
+            <p:extLst>
+              <p:ext uri="{386F3935-93C4-4BCD-93E2-E3B085C9AB24}">
+                <p16:designElem xmlns:p16="http://schemas.microsoft.com/office/powerpoint/2015/main" val="1"/>
+              </p:ext>
+            </p:extLst>
+          </p:nvPr>
+        </p:nvSpPr>
+        <p:spPr>
+          <a:xfrm>
+            <a:off x="0" y="0"/>
+            <a:ext cx="182880" cy="6858000"/>
+          </a:xfrm>
+          <a:prstGeom prst="rect">
+            <a:avLst/>
+          </a:prstGeom>
+          <a:solidFill>
+            <a:schemeClr val="tx2"/>
+          </a:solidFill>
+          <a:ln>
+            <a:noFill/>
+          </a:ln>
+          <a:effectLst/>
+        </p:spPr>
+        <p:style>
+          <a:lnRef idx="1">
+            <a:schemeClr val="accent1"/>
+          </a:lnRef>
+          <a:fillRef idx="3">
+            <a:schemeClr val="accent1"/>
+          </a:fillRef>
+          <a:effectRef idx="2">
+            <a:schemeClr val="accent1"/>
+          </a:effectRef>
+          <a:fontRef idx="minor">
+            <a:schemeClr val="lt1"/>
+          </a:fontRef>
+        </p:style>
+      </p:sp>
+      <p:sp>
+        <p:nvSpPr>
+          <p:cNvPr id="2" name="Title 1">
+            <a:extLst>
+              <a:ext uri="{FF2B5EF4-FFF2-40B4-BE49-F238E27FC236}">
+                <a16:creationId xmlns:a16="http://schemas.microsoft.com/office/drawing/2014/main" id="{288EF0FE-615B-4E22-B707-87306E05A50F}"/>
+              </a:ext>
+            </a:extLst>
+          </p:cNvPr>
+          <p:cNvSpPr>
+            <a:spLocks noGrp="1"/>
+          </p:cNvSpPr>
+          <p:nvPr>
+            <p:ph type="title"/>
+          </p:nvPr>
+        </p:nvSpPr>
+        <p:spPr>
+          <a:xfrm>
+            <a:off x="1046019" y="942108"/>
+            <a:ext cx="3256550" cy="4969113"/>
+          </a:xfrm>
+        </p:spPr>
+        <p:txBody>
+          <a:bodyPr anchor="ctr">
+            <a:normAutofit/>
+          </a:bodyPr>
+          <a:lstStyle/>
+          <a:p>
+            <a:r>
+              <a:rPr lang="en-US">
+                <a:solidFill>
+                  <a:schemeClr val="tx2">
+                    <a:lumMod val="75000"/>
+                  </a:schemeClr>
+                </a:solidFill>
+              </a:rPr>
+              <a:t>Our Future Vision</a:t>
+            </a:r>
+            <a:endParaRPr lang="en-US" dirty="0">
+              <a:solidFill>
+                <a:schemeClr val="tx2">
+                  <a:lumMod val="75000"/>
+                </a:schemeClr>
+              </a:solidFill>
+            </a:endParaRPr>
+          </a:p>
+        </p:txBody>
+      </p:sp>
+      <p:sp>
+        <p:nvSpPr>
+          <p:cNvPr id="3" name="Content Placeholder 2">
+            <a:extLst>
+              <a:ext uri="{FF2B5EF4-FFF2-40B4-BE49-F238E27FC236}">
+                <a16:creationId xmlns:a16="http://schemas.microsoft.com/office/drawing/2014/main" id="{DAFEFBB7-87D6-4E85-8A27-4C6CF4722CAC}"/>
+              </a:ext>
+            </a:extLst>
+          </p:cNvPr>
+          <p:cNvSpPr>
+            <a:spLocks noGrp="1"/>
+          </p:cNvSpPr>
+          <p:nvPr>
+            <p:ph idx="1"/>
+          </p:nvPr>
+        </p:nvSpPr>
+        <p:spPr>
+          <a:xfrm>
+            <a:off x="5049062" y="942108"/>
+            <a:ext cx="6455549" cy="4969114"/>
+          </a:xfrm>
+        </p:spPr>
+        <p:txBody>
+          <a:bodyPr anchor="ctr">
+            <a:normAutofit/>
+          </a:bodyPr>
+          <a:lstStyle/>
+          <a:p>
+            <a:r>
+              <a:rPr lang="en-US" sz="2000" dirty="0">
+                <a:solidFill>
+                  <a:schemeClr val="tx2">
+                    <a:lumMod val="75000"/>
+                  </a:schemeClr>
+                </a:solidFill>
+              </a:rPr>
+              <a:t>Rolling out </a:t>
+            </a:r>
+            <a:r>
+              <a:rPr lang="en-US" sz="2000" dirty="0" err="1">
+                <a:solidFill>
+                  <a:schemeClr val="tx2">
+                    <a:lumMod val="75000"/>
+                  </a:schemeClr>
+                </a:solidFill>
+              </a:rPr>
+              <a:t>Qiosks</a:t>
+            </a:r>
+            <a:r>
+              <a:rPr lang="en-US" sz="2000" dirty="0">
+                <a:solidFill>
+                  <a:schemeClr val="tx2">
+                    <a:lumMod val="75000"/>
+                  </a:schemeClr>
+                </a:solidFill>
+              </a:rPr>
+              <a:t> to metropolitan areas that are in the most need for earning income and where businesses might be hesitant.</a:t>
+            </a:r>
+          </a:p>
+          <a:p>
+            <a:r>
+              <a:rPr lang="en-US" sz="2000" dirty="0">
+                <a:solidFill>
+                  <a:schemeClr val="tx2">
+                    <a:lumMod val="75000"/>
+                  </a:schemeClr>
+                </a:solidFill>
+              </a:rPr>
+              <a:t>Implement </a:t>
+            </a:r>
+            <a:r>
+              <a:rPr lang="en-US" sz="2000" dirty="0" err="1">
+                <a:solidFill>
+                  <a:schemeClr val="tx2">
+                    <a:lumMod val="75000"/>
+                  </a:schemeClr>
+                </a:solidFill>
+              </a:rPr>
+              <a:t>DragonBoard</a:t>
+            </a:r>
+            <a:r>
+              <a:rPr lang="en-US" sz="2000" dirty="0">
+                <a:solidFill>
+                  <a:schemeClr val="tx2">
+                    <a:lumMod val="75000"/>
+                  </a:schemeClr>
+                </a:solidFill>
+              </a:rPr>
+              <a:t> to be the low-cost computer behind the </a:t>
+            </a:r>
+            <a:r>
+              <a:rPr lang="en-US" sz="2000" dirty="0" err="1">
+                <a:solidFill>
+                  <a:schemeClr val="tx2">
+                    <a:lumMod val="75000"/>
+                  </a:schemeClr>
+                </a:solidFill>
+              </a:rPr>
+              <a:t>Qiosk</a:t>
+            </a:r>
+            <a:endParaRPr lang="en-US" sz="2000" dirty="0">
+              <a:solidFill>
+                <a:schemeClr val="tx2">
+                  <a:lumMod val="75000"/>
+                </a:schemeClr>
+              </a:solidFill>
+            </a:endParaRPr>
+          </a:p>
+          <a:p>
+            <a:pPr lvl="1"/>
+            <a:r>
+              <a:rPr lang="en-US" sz="2000" dirty="0">
+                <a:solidFill>
+                  <a:schemeClr val="tx2">
+                    <a:lumMod val="75000"/>
+                  </a:schemeClr>
+                </a:solidFill>
+              </a:rPr>
+              <a:t>Implement LTE for remote internet access</a:t>
+            </a:r>
+          </a:p>
+          <a:p>
+            <a:r>
+              <a:rPr lang="en-US" sz="2000" dirty="0">
+                <a:solidFill>
+                  <a:schemeClr val="tx2">
+                    <a:lumMod val="75000"/>
+                  </a:schemeClr>
+                </a:solidFill>
+              </a:rPr>
+              <a:t>Holding Community Events to Hire Low-Skilled Labor and Build Reputation</a:t>
+            </a:r>
+          </a:p>
+          <a:p>
+            <a:endParaRPr lang="en-US" dirty="0">
+              <a:solidFill>
+                <a:schemeClr val="tx2">
+                  <a:lumMod val="75000"/>
+                </a:schemeClr>
+              </a:solidFill>
+            </a:endParaRPr>
+          </a:p>
+        </p:txBody>
+      </p:sp>
+    </p:spTree>
+    <p:extLst>
+      <p:ext uri="{BB962C8B-B14F-4D97-AF65-F5344CB8AC3E}">
+        <p14:creationId xmlns:p14="http://schemas.microsoft.com/office/powerpoint/2010/main" val="632792480"/>
+      </p:ext>
+    </p:extLst>
+  </p:cSld>
+  <p:clrMapOvr>
+    <a:masterClrMapping/>
+  </p:clrMapOvr>
+</p:sld>
+</file>
+
+<file path=ppt/slides/slide7.xml><?xml version="1.0" encoding="utf-8"?>
 <p:sld xmlns:a="http://schemas.openxmlformats.org/drawingml/2006/main" xmlns:r="http://schemas.openxmlformats.org/officeDocument/2006/relationships" xmlns:p="http://schemas.openxmlformats.org/presentationml/2006/main">
   <p:cSld>
     <p:spTree>

</xml_diff>